<commit_message>
Updating notebook and PPT
</commit_message>
<xml_diff>
--- a/Presentation.pptx
+++ b/Presentation.pptx
@@ -11,6 +11,7 @@
     <p:sldId id="259" r:id="rId5"/>
     <p:sldId id="260" r:id="rId6"/>
     <p:sldId id="261" r:id="rId7"/>
+    <p:sldId id="262" r:id="rId8"/>
   </p:sldIdLst>
   <p:sldSz cx="12192000" cy="6858000"/>
   <p:notesSz cx="6858000" cy="9144000"/>
@@ -6077,7 +6078,7 @@
           <a:p>
             <a:r>
               <a:rPr lang="en-US" dirty="0" smtClean="0"/>
-              <a:t>Picked up almost all of my data science machine learning knowledge from the web.</a:t>
+              <a:t>Picked up almost all of my data science machine learning knowledge from the web tutorials/ online courses.</a:t>
             </a:r>
           </a:p>
           <a:p>
@@ -6916,6 +6917,260 @@
           </p:style>
         </p:cxnSp>
       </p:grpSp>
+      <mc:AlternateContent xmlns:mc="http://schemas.openxmlformats.org/markup-compatibility/2006">
+        <mc:Choice xmlns:a14="http://schemas.microsoft.com/office/drawing/2010/main" Requires="a14">
+          <p:sp>
+            <p:nvSpPr>
+              <p:cNvPr id="4" name="TextBox 3"/>
+              <p:cNvSpPr txBox="1"/>
+              <p:nvPr/>
+            </p:nvSpPr>
+            <p:spPr>
+              <a:xfrm>
+                <a:off x="207368" y="5616418"/>
+                <a:ext cx="7699095" cy="641714"/>
+              </a:xfrm>
+              <a:prstGeom prst="rect">
+                <a:avLst/>
+              </a:prstGeom>
+              <a:noFill/>
+            </p:spPr>
+            <p:txBody>
+              <a:bodyPr wrap="square" lIns="0" tIns="0" rIns="0" bIns="0" rtlCol="0">
+                <a:spAutoFit/>
+              </a:bodyPr>
+              <a:lstStyle/>
+              <a:p>
+                <a14:m>
+                  <m:oMathPara xmlns:m="http://schemas.openxmlformats.org/officeDocument/2006/math">
+                    <m:oMathParaPr>
+                      <m:jc m:val="centerGroup"/>
+                    </m:oMathParaPr>
+                    <m:oMath xmlns:m="http://schemas.openxmlformats.org/officeDocument/2006/math">
+                      <m:r>
+                        <a:rPr lang="en-US" sz="2200" b="0" i="1" smtClean="0">
+                          <a:latin typeface="Cambria Math" charset="0"/>
+                        </a:rPr>
+                        <m:t>𝑃𝑟𝑒𝑐𝑖𝑠𝑖𝑜𝑛</m:t>
+                      </m:r>
+                      <m:r>
+                        <a:rPr lang="en-US" sz="2200" b="0" i="1" smtClean="0">
+                          <a:latin typeface="Cambria Math" charset="0"/>
+                        </a:rPr>
+                        <m:t>= </m:t>
+                      </m:r>
+                      <m:f>
+                        <m:fPr>
+                          <m:ctrlPr>
+                            <a:rPr lang="bg-BG" sz="2200" b="0" i="1" smtClean="0">
+                              <a:latin typeface="Cambria Math" charset="0"/>
+                            </a:rPr>
+                          </m:ctrlPr>
+                        </m:fPr>
+                        <m:num>
+                          <m:r>
+                            <a:rPr lang="en-US" sz="2200" b="0" i="1" smtClean="0">
+                              <a:latin typeface="Cambria Math" charset="0"/>
+                            </a:rPr>
+                            <m:t>𝑇𝑃</m:t>
+                          </m:r>
+                        </m:num>
+                        <m:den>
+                          <m:r>
+                            <a:rPr lang="en-US" sz="2200" b="0" i="1" smtClean="0">
+                              <a:latin typeface="Cambria Math" charset="0"/>
+                            </a:rPr>
+                            <m:t>𝑇𝑃</m:t>
+                          </m:r>
+                          <m:r>
+                            <a:rPr lang="en-US" sz="2200" b="0" i="1" smtClean="0">
+                              <a:latin typeface="Cambria Math" charset="0"/>
+                            </a:rPr>
+                            <m:t>+</m:t>
+                          </m:r>
+                          <m:r>
+                            <a:rPr lang="en-US" sz="2200" b="0" i="1" smtClean="0">
+                              <a:latin typeface="Cambria Math" charset="0"/>
+                            </a:rPr>
+                            <m:t>𝐹𝑃</m:t>
+                          </m:r>
+                        </m:den>
+                      </m:f>
+                      <m:r>
+                        <a:rPr lang="en-US" sz="2200" b="0" i="1" smtClean="0">
+                          <a:latin typeface="Cambria Math" charset="0"/>
+                        </a:rPr>
+                        <m:t>, </m:t>
+                      </m:r>
+                      <m:r>
+                        <a:rPr lang="en-US" sz="2200" b="0" i="1" smtClean="0">
+                          <a:latin typeface="Cambria Math" charset="0"/>
+                        </a:rPr>
+                        <m:t>𝑅𝑒𝑐𝑎𝑙𝑙</m:t>
+                      </m:r>
+                      <m:r>
+                        <a:rPr lang="en-US" sz="2200" b="0" i="1" smtClean="0">
+                          <a:latin typeface="Cambria Math" charset="0"/>
+                        </a:rPr>
+                        <m:t>= </m:t>
+                      </m:r>
+                      <m:f>
+                        <m:fPr>
+                          <m:ctrlPr>
+                            <a:rPr lang="bg-BG" sz="2200" b="0" i="1" smtClean="0">
+                              <a:latin typeface="Cambria Math" charset="0"/>
+                            </a:rPr>
+                          </m:ctrlPr>
+                        </m:fPr>
+                        <m:num>
+                          <m:r>
+                            <a:rPr lang="en-US" sz="2200" b="0" i="1" smtClean="0">
+                              <a:latin typeface="Cambria Math" charset="0"/>
+                            </a:rPr>
+                            <m:t>𝑇𝑃</m:t>
+                          </m:r>
+                        </m:num>
+                        <m:den>
+                          <m:r>
+                            <a:rPr lang="en-US" sz="2200" b="0" i="1" smtClean="0">
+                              <a:latin typeface="Cambria Math" charset="0"/>
+                            </a:rPr>
+                            <m:t>𝑇𝑃</m:t>
+                          </m:r>
+                          <m:r>
+                            <a:rPr lang="en-US" sz="2200" b="0" i="1" smtClean="0">
+                              <a:latin typeface="Cambria Math" charset="0"/>
+                            </a:rPr>
+                            <m:t>+</m:t>
+                          </m:r>
+                          <m:r>
+                            <a:rPr lang="en-US" sz="2200" b="0" i="1" smtClean="0">
+                              <a:latin typeface="Cambria Math" charset="0"/>
+                            </a:rPr>
+                            <m:t>𝐹𝑁</m:t>
+                          </m:r>
+                        </m:den>
+                      </m:f>
+                      <m:r>
+                        <a:rPr lang="en-US" sz="2200" b="0" i="1" smtClean="0">
+                          <a:latin typeface="Cambria Math" charset="0"/>
+                        </a:rPr>
+                        <m:t> , </m:t>
+                      </m:r>
+                      <m:r>
+                        <a:rPr lang="en-US" sz="2200" b="0" i="1" smtClean="0">
+                          <a:latin typeface="Cambria Math" charset="0"/>
+                        </a:rPr>
+                        <m:t>𝐹</m:t>
+                      </m:r>
+                      <m:r>
+                        <a:rPr lang="en-US" sz="2200" b="0" i="1" smtClean="0">
+                          <a:latin typeface="Cambria Math" charset="0"/>
+                        </a:rPr>
+                        <m:t>1=</m:t>
+                      </m:r>
+                      <m:f>
+                        <m:fPr>
+                          <m:ctrlPr>
+                            <a:rPr lang="bg-BG" sz="2200" b="0" i="1" smtClean="0">
+                              <a:latin typeface="Cambria Math" charset="0"/>
+                            </a:rPr>
+                          </m:ctrlPr>
+                        </m:fPr>
+                        <m:num>
+                          <m:r>
+                            <a:rPr lang="en-US" sz="2200" b="0" i="1" smtClean="0">
+                              <a:latin typeface="Cambria Math" charset="0"/>
+                            </a:rPr>
+                            <m:t>2∗</m:t>
+                          </m:r>
+                          <m:r>
+                            <a:rPr lang="en-US" sz="2200" b="0" i="1" smtClean="0">
+                              <a:latin typeface="Cambria Math" charset="0"/>
+                            </a:rPr>
+                            <m:t>𝑃</m:t>
+                          </m:r>
+                          <m:r>
+                            <a:rPr lang="en-US" sz="2200" b="0" i="1" smtClean="0">
+                              <a:latin typeface="Cambria Math" charset="0"/>
+                            </a:rPr>
+                            <m:t>∗</m:t>
+                          </m:r>
+                          <m:r>
+                            <a:rPr lang="en-US" sz="2200" b="0" i="1" smtClean="0">
+                              <a:latin typeface="Cambria Math" charset="0"/>
+                            </a:rPr>
+                            <m:t>𝑅</m:t>
+                          </m:r>
+                        </m:num>
+                        <m:den>
+                          <m:r>
+                            <a:rPr lang="en-US" sz="2200" b="0" i="1" smtClean="0">
+                              <a:latin typeface="Cambria Math" charset="0"/>
+                            </a:rPr>
+                            <m:t>𝑃</m:t>
+                          </m:r>
+                          <m:r>
+                            <a:rPr lang="en-US" sz="2200" b="0" i="1" smtClean="0">
+                              <a:latin typeface="Cambria Math" charset="0"/>
+                            </a:rPr>
+                            <m:t>+</m:t>
+                          </m:r>
+                          <m:r>
+                            <a:rPr lang="en-US" sz="2200" b="0" i="1" smtClean="0">
+                              <a:latin typeface="Cambria Math" charset="0"/>
+                            </a:rPr>
+                            <m:t>𝑅</m:t>
+                          </m:r>
+                        </m:den>
+                      </m:f>
+                    </m:oMath>
+                  </m:oMathPara>
+                </a14:m>
+                <a:endParaRPr lang="en-US" sz="2200" dirty="0"/>
+              </a:p>
+            </p:txBody>
+          </p:sp>
+        </mc:Choice>
+        <mc:Fallback>
+          <p:sp>
+            <p:nvSpPr>
+              <p:cNvPr id="4" name="TextBox 3"/>
+              <p:cNvSpPr txBox="1">
+                <a:spLocks noRot="1" noChangeAspect="1" noMove="1" noResize="1" noEditPoints="1" noAdjustHandles="1" noChangeArrowheads="1" noChangeShapeType="1" noTextEdit="1"/>
+              </p:cNvSpPr>
+              <p:nvPr/>
+            </p:nvSpPr>
+            <p:spPr>
+              <a:xfrm>
+                <a:off x="207368" y="5616418"/>
+                <a:ext cx="7699095" cy="641714"/>
+              </a:xfrm>
+              <a:prstGeom prst="rect">
+                <a:avLst/>
+              </a:prstGeom>
+              <a:blipFill rotWithShape="0">
+                <a:blip r:embed="rId3"/>
+                <a:stretch>
+                  <a:fillRect/>
+                </a:stretch>
+              </a:blipFill>
+            </p:spPr>
+            <p:txBody>
+              <a:bodyPr/>
+              <a:lstStyle/>
+              <a:p>
+                <a:r>
+                  <a:rPr lang="en-US">
+                    <a:noFill/>
+                  </a:rPr>
+                  <a:t> </a:t>
+                </a:r>
+              </a:p>
+            </p:txBody>
+          </p:sp>
+        </mc:Fallback>
+      </mc:AlternateContent>
     </p:spTree>
     <p:extLst>
       <p:ext uri="{BB962C8B-B14F-4D97-AF65-F5344CB8AC3E}">
@@ -7066,6 +7321,49 @@
                                   </p:subTnLst>
                                 </p:cTn>
                               </p:par>
+                              <p:par>
+                                <p:cTn id="11" presetID="1" presetClass="entr" presetSubtype="0" fill="hold" grpId="0" nodeType="withEffect">
+                                  <p:stCondLst>
+                                    <p:cond delay="0"/>
+                                  </p:stCondLst>
+                                  <p:childTnLst>
+                                    <p:set>
+                                      <p:cBhvr>
+                                        <p:cTn id="12" dur="1" fill="hold">
+                                          <p:stCondLst>
+                                            <p:cond delay="0"/>
+                                          </p:stCondLst>
+                                        </p:cTn>
+                                        <p:tgtEl>
+                                          <p:spTgt spid="4"/>
+                                        </p:tgtEl>
+                                        <p:attrNameLst>
+                                          <p:attrName>style.visibility</p:attrName>
+                                        </p:attrNameLst>
+                                      </p:cBhvr>
+                                      <p:to>
+                                        <p:strVal val="visible"/>
+                                      </p:to>
+                                    </p:set>
+                                  </p:childTnLst>
+                                  <p:subTnLst>
+                                    <p:set>
+                                      <p:cBhvr override="childStyle">
+                                        <p:cTn dur="1" fill="hold" display="0" masterRel="nextClick" afterEffect="1"/>
+                                        <p:tgtEl>
+                                          <p:spTgt spid="4"/>
+                                        </p:tgtEl>
+                                        <p:attrNameLst>
+                                          <p:attrName>style.visibility</p:attrName>
+                                        </p:attrNameLst>
+                                      </p:cBhvr>
+                                      <p:to>
+                                        <p:strVal val="hidden"/>
+                                      </p:to>
+                                    </p:set>
+                                  </p:subTnLst>
+                                </p:cTn>
+                              </p:par>
                             </p:childTnLst>
                           </p:cTn>
                         </p:par>
@@ -7073,26 +7371,26 @@
                     </p:cTn>
                   </p:par>
                   <p:par>
-                    <p:cTn id="11" fill="hold">
+                    <p:cTn id="13" fill="hold">
                       <p:stCondLst>
                         <p:cond delay="indefinite"/>
                       </p:stCondLst>
                       <p:childTnLst>
                         <p:par>
-                          <p:cTn id="12" fill="hold">
+                          <p:cTn id="14" fill="hold">
                             <p:stCondLst>
                               <p:cond delay="0"/>
                             </p:stCondLst>
                             <p:childTnLst>
                               <p:par>
-                                <p:cTn id="13" presetID="1" presetClass="entr" presetSubtype="0" fill="hold" nodeType="clickEffect">
+                                <p:cTn id="15" presetID="1" presetClass="entr" presetSubtype="0" fill="hold" nodeType="clickEffect">
                                   <p:stCondLst>
                                     <p:cond delay="0"/>
                                   </p:stCondLst>
                                   <p:childTnLst>
                                     <p:set>
                                       <p:cBhvr>
-                                        <p:cTn id="14" dur="1" fill="hold">
+                                        <p:cTn id="16" dur="1" fill="hold">
                                           <p:stCondLst>
                                             <p:cond delay="0"/>
                                           </p:stCondLst>
@@ -7112,14 +7410,14 @@
                                 </p:cTn>
                               </p:par>
                               <p:par>
-                                <p:cTn id="15" presetID="1" presetClass="entr" presetSubtype="0" fill="hold" grpId="0" nodeType="withEffect">
+                                <p:cTn id="17" presetID="1" presetClass="entr" presetSubtype="0" fill="hold" grpId="0" nodeType="withEffect">
                                   <p:stCondLst>
                                     <p:cond delay="0"/>
                                   </p:stCondLst>
                                   <p:childTnLst>
                                     <p:set>
                                       <p:cBhvr>
-                                        <p:cTn id="16" dur="1" fill="hold">
+                                        <p:cTn id="18" dur="1" fill="hold">
                                           <p:stCondLst>
                                             <p:cond delay="0"/>
                                           </p:stCondLst>
@@ -7149,26 +7447,26 @@
                     </p:cTn>
                   </p:par>
                   <p:par>
-                    <p:cTn id="17" fill="hold">
+                    <p:cTn id="19" fill="hold">
                       <p:stCondLst>
                         <p:cond delay="indefinite"/>
                       </p:stCondLst>
                       <p:childTnLst>
                         <p:par>
-                          <p:cTn id="18" fill="hold">
+                          <p:cTn id="20" fill="hold">
                             <p:stCondLst>
                               <p:cond delay="0"/>
                             </p:stCondLst>
                             <p:childTnLst>
                               <p:par>
-                                <p:cTn id="19" presetID="1" presetClass="entr" presetSubtype="0" fill="hold" grpId="0" nodeType="clickEffect">
+                                <p:cTn id="21" presetID="1" presetClass="entr" presetSubtype="0" fill="hold" grpId="0" nodeType="clickEffect">
                                   <p:stCondLst>
                                     <p:cond delay="0"/>
                                   </p:stCondLst>
                                   <p:childTnLst>
                                     <p:set>
                                       <p:cBhvr>
-                                        <p:cTn id="20" dur="1" fill="hold">
+                                        <p:cTn id="22" dur="1" fill="hold">
                                           <p:stCondLst>
                                             <p:cond delay="0"/>
                                           </p:stCondLst>
@@ -7198,26 +7496,26 @@
                     </p:cTn>
                   </p:par>
                   <p:par>
-                    <p:cTn id="21" fill="hold">
+                    <p:cTn id="23" fill="hold">
                       <p:stCondLst>
                         <p:cond delay="indefinite"/>
                       </p:stCondLst>
                       <p:childTnLst>
                         <p:par>
-                          <p:cTn id="22" fill="hold">
+                          <p:cTn id="24" fill="hold">
                             <p:stCondLst>
                               <p:cond delay="0"/>
                             </p:stCondLst>
                             <p:childTnLst>
                               <p:par>
-                                <p:cTn id="23" presetID="1" presetClass="entr" presetSubtype="0" fill="hold" grpId="0" nodeType="clickEffect">
+                                <p:cTn id="25" presetID="1" presetClass="entr" presetSubtype="0" fill="hold" grpId="0" nodeType="clickEffect">
                                   <p:stCondLst>
                                     <p:cond delay="0"/>
                                   </p:stCondLst>
                                   <p:childTnLst>
                                     <p:set>
                                       <p:cBhvr>
-                                        <p:cTn id="24" dur="1" fill="hold">
+                                        <p:cTn id="26" dur="1" fill="hold">
                                           <p:stCondLst>
                                             <p:cond delay="0"/>
                                           </p:stCondLst>
@@ -7247,26 +7545,26 @@
                     </p:cTn>
                   </p:par>
                   <p:par>
-                    <p:cTn id="25" fill="hold">
+                    <p:cTn id="27" fill="hold">
                       <p:stCondLst>
                         <p:cond delay="indefinite"/>
                       </p:stCondLst>
                       <p:childTnLst>
                         <p:par>
-                          <p:cTn id="26" fill="hold">
+                          <p:cTn id="28" fill="hold">
                             <p:stCondLst>
                               <p:cond delay="0"/>
                             </p:stCondLst>
                             <p:childTnLst>
                               <p:par>
-                                <p:cTn id="27" presetID="1" presetClass="entr" presetSubtype="0" fill="hold" grpId="0" nodeType="clickEffect">
+                                <p:cTn id="29" presetID="1" presetClass="entr" presetSubtype="0" fill="hold" grpId="0" nodeType="clickEffect">
                                   <p:stCondLst>
                                     <p:cond delay="0"/>
                                   </p:stCondLst>
                                   <p:childTnLst>
                                     <p:set>
                                       <p:cBhvr>
-                                        <p:cTn id="28" dur="1" fill="hold">
+                                        <p:cTn id="30" dur="1" fill="hold">
                                           <p:stCondLst>
                                             <p:cond delay="0"/>
                                           </p:stCondLst>
@@ -7318,6 +7616,7 @@
     </p:tnLst>
     <p:bldLst>
       <p:bldP spid="3" grpId="0" uiExpand="1" build="p"/>
+      <p:bldP spid="4" grpId="0"/>
     </p:bldLst>
   </p:timing>
 </p:sld>
@@ -7492,6 +7791,74 @@
     <p:extLst>
       <p:ext uri="{BB962C8B-B14F-4D97-AF65-F5344CB8AC3E}">
         <p14:creationId xmlns:p14="http://schemas.microsoft.com/office/powerpoint/2010/main" val="2120528613"/>
+      </p:ext>
+    </p:extLst>
+  </p:cSld>
+  <p:clrMapOvr>
+    <a:masterClrMapping/>
+  </p:clrMapOvr>
+  <p:timing>
+    <p:tnLst>
+      <p:par>
+        <p:cTn id="1" dur="indefinite" restart="never" nodeType="tmRoot"/>
+      </p:par>
+    </p:tnLst>
+  </p:timing>
+</p:sld>
+</file>
+
+<file path=ppt/slides/slide7.xml><?xml version="1.0" encoding="utf-8"?>
+<p:sld xmlns:a="http://schemas.openxmlformats.org/drawingml/2006/main" xmlns:r="http://schemas.openxmlformats.org/officeDocument/2006/relationships" xmlns:p="http://schemas.openxmlformats.org/presentationml/2006/main">
+  <p:cSld>
+    <p:spTree>
+      <p:nvGrpSpPr>
+        <p:cNvPr id="1" name=""/>
+        <p:cNvGrpSpPr/>
+        <p:nvPr/>
+      </p:nvGrpSpPr>
+      <p:grpSpPr>
+        <a:xfrm>
+          <a:off x="0" y="0"/>
+          <a:ext cx="0" cy="0"/>
+          <a:chOff x="0" y="0"/>
+          <a:chExt cx="0" cy="0"/>
+        </a:xfrm>
+      </p:grpSpPr>
+      <p:sp>
+        <p:nvSpPr>
+          <p:cNvPr id="2" name="Title 1"/>
+          <p:cNvSpPr>
+            <a:spLocks noGrp="1"/>
+          </p:cNvSpPr>
+          <p:nvPr>
+            <p:ph type="title"/>
+          </p:nvPr>
+        </p:nvSpPr>
+        <p:spPr>
+          <a:xfrm>
+            <a:off x="1053115" y="2739025"/>
+            <a:ext cx="8596668" cy="1320800"/>
+          </a:xfrm>
+        </p:spPr>
+        <p:txBody>
+          <a:bodyPr>
+            <a:normAutofit/>
+          </a:bodyPr>
+          <a:lstStyle/>
+          <a:p>
+            <a:pPr algn="ctr"/>
+            <a:r>
+              <a:rPr lang="en-US" sz="4400" b="1" dirty="0" smtClean="0"/>
+              <a:t>Thank You</a:t>
+            </a:r>
+            <a:endParaRPr lang="en-US" sz="4400" b="1" dirty="0"/>
+          </a:p>
+        </p:txBody>
+      </p:sp>
+    </p:spTree>
+    <p:extLst>
+      <p:ext uri="{BB962C8B-B14F-4D97-AF65-F5344CB8AC3E}">
+        <p14:creationId xmlns:p14="http://schemas.microsoft.com/office/powerpoint/2010/main" val="131816089"/>
       </p:ext>
     </p:extLst>
   </p:cSld>

</xml_diff>